<commit_message>
Updated presentation to debugging
</commit_message>
<xml_diff>
--- a/DebuggingTipsAndTrics/WUG_Days_Debugging.pptx
+++ b/DebuggingTipsAndTrics/WUG_Days_Debugging.pptx
@@ -176,10 +176,9 @@
           </a:lstStyle>
           <a:p>
             <a:r>
-              <a:rPr lang="en-US" dirty="0" smtClean="0"/>
+              <a:rPr lang="en-US" dirty="0"/>
               <a:t>CLICK TO EDIT MASTER TITLE STYLE</a:t>
             </a:r>
-            <a:endParaRPr lang="en-US" dirty="0"/>
           </a:p>
         </p:txBody>
       </p:sp>
@@ -247,7 +246,7 @@
           </a:lstStyle>
           <a:p>
             <a:r>
-              <a:rPr lang="en-US" smtClean="0"/>
+              <a:rPr lang="en-US"/>
               <a:t>Click to edit Master subtitle style</a:t>
             </a:r>
             <a:endParaRPr lang="en-US" dirty="0"/>
@@ -264,7 +263,7 @@
   <p:clrMapOvr>
     <a:masterClrMapping/>
   </p:clrMapOvr>
-  <p:extLst mod="1">
+  <p:extLst>
     <p:ext uri="{DCECCB84-F9BA-43D5-87BE-67443E8EF086}">
       <p15:sldGuideLst xmlns:p15="http://schemas.microsoft.com/office/powerpoint/2012/main">
         <p15:guide id="1" orient="horz" pos="2652" userDrawn="1">
@@ -324,10 +323,9 @@
           </a:lstStyle>
           <a:p>
             <a:r>
-              <a:rPr lang="en-US" dirty="0" smtClean="0"/>
+              <a:rPr lang="en-US" dirty="0"/>
               <a:t>CLICK TO EDIT MASTER TITLE STYLE</a:t>
             </a:r>
-            <a:endParaRPr lang="en-US" dirty="0"/>
           </a:p>
         </p:txBody>
       </p:sp>
@@ -348,38 +346,37 @@
           <a:p>
             <a:pPr lvl="0"/>
             <a:r>
-              <a:rPr lang="en-US" smtClean="0"/>
+              <a:rPr lang="en-US"/>
               <a:t>Click to edit Master text styles</a:t>
             </a:r>
           </a:p>
           <a:p>
             <a:pPr lvl="1"/>
             <a:r>
-              <a:rPr lang="en-US" smtClean="0"/>
+              <a:rPr lang="en-US"/>
               <a:t>Second level</a:t>
             </a:r>
           </a:p>
           <a:p>
             <a:pPr lvl="2"/>
             <a:r>
-              <a:rPr lang="en-US" smtClean="0"/>
+              <a:rPr lang="en-US"/>
               <a:t>Third level</a:t>
             </a:r>
           </a:p>
           <a:p>
             <a:pPr lvl="3"/>
             <a:r>
-              <a:rPr lang="en-US" smtClean="0"/>
+              <a:rPr lang="en-US"/>
               <a:t>Fourth level</a:t>
             </a:r>
           </a:p>
           <a:p>
             <a:pPr lvl="4"/>
             <a:r>
-              <a:rPr lang="en-US" smtClean="0"/>
+              <a:rPr lang="en-US"/>
               <a:t>Fifth level</a:t>
             </a:r>
-            <a:endParaRPr lang="en-US"/>
           </a:p>
         </p:txBody>
       </p:sp>
@@ -400,7 +397,7 @@
           <a:p>
             <a:fld id="{4A3945FA-A57E-4979-A688-04297D70ECDD}" type="datetimeFigureOut">
               <a:rPr lang="en-US" smtClean="0"/>
-              <a:t>10/8/2016</a:t>
+              <a:t>3/21/2022</a:t>
             </a:fld>
             <a:endParaRPr lang="en-US"/>
           </a:p>
@@ -462,13 +459,6 @@
   <p:clrMapOvr>
     <a:masterClrMapping/>
   </p:clrMapOvr>
-  <p:timing>
-    <p:tnLst>
-      <p:par>
-        <p:cTn id="1" dur="indefinite" restart="never" nodeType="tmRoot"/>
-      </p:par>
-    </p:tnLst>
-  </p:timing>
 </p:sldLayout>
 </file>
 
@@ -505,10 +495,9 @@
           <a:lstStyle/>
           <a:p>
             <a:r>
-              <a:rPr lang="en-US" dirty="0" smtClean="0"/>
+              <a:rPr lang="en-US" dirty="0"/>
               <a:t>CLICK TO EDIT MASTER TITLE STYLE</a:t>
             </a:r>
-            <a:endParaRPr lang="en-US" dirty="0"/>
           </a:p>
         </p:txBody>
       </p:sp>
@@ -534,38 +523,37 @@
           <a:p>
             <a:pPr lvl="0"/>
             <a:r>
-              <a:rPr lang="en-US" smtClean="0"/>
+              <a:rPr lang="en-US"/>
               <a:t>Click to edit Master text styles</a:t>
             </a:r>
           </a:p>
           <a:p>
             <a:pPr lvl="1"/>
             <a:r>
-              <a:rPr lang="en-US" smtClean="0"/>
+              <a:rPr lang="en-US"/>
               <a:t>Second level</a:t>
             </a:r>
           </a:p>
           <a:p>
             <a:pPr lvl="2"/>
             <a:r>
-              <a:rPr lang="en-US" smtClean="0"/>
+              <a:rPr lang="en-US"/>
               <a:t>Third level</a:t>
             </a:r>
           </a:p>
           <a:p>
             <a:pPr lvl="3"/>
             <a:r>
-              <a:rPr lang="en-US" smtClean="0"/>
+              <a:rPr lang="en-US"/>
               <a:t>Fourth level</a:t>
             </a:r>
           </a:p>
           <a:p>
             <a:pPr lvl="4"/>
             <a:r>
-              <a:rPr lang="en-US" smtClean="0"/>
+              <a:rPr lang="en-US"/>
               <a:t>Fifth level</a:t>
             </a:r>
-            <a:endParaRPr lang="en-US"/>
           </a:p>
         </p:txBody>
       </p:sp>
@@ -591,38 +579,37 @@
           <a:p>
             <a:pPr lvl="0"/>
             <a:r>
-              <a:rPr lang="en-US" smtClean="0"/>
+              <a:rPr lang="en-US"/>
               <a:t>Click to edit Master text styles</a:t>
             </a:r>
           </a:p>
           <a:p>
             <a:pPr lvl="1"/>
             <a:r>
-              <a:rPr lang="en-US" smtClean="0"/>
+              <a:rPr lang="en-US"/>
               <a:t>Second level</a:t>
             </a:r>
           </a:p>
           <a:p>
             <a:pPr lvl="2"/>
             <a:r>
-              <a:rPr lang="en-US" smtClean="0"/>
+              <a:rPr lang="en-US"/>
               <a:t>Third level</a:t>
             </a:r>
           </a:p>
           <a:p>
             <a:pPr lvl="3"/>
             <a:r>
-              <a:rPr lang="en-US" smtClean="0"/>
+              <a:rPr lang="en-US"/>
               <a:t>Fourth level</a:t>
             </a:r>
           </a:p>
           <a:p>
             <a:pPr lvl="4"/>
             <a:r>
-              <a:rPr lang="en-US" smtClean="0"/>
+              <a:rPr lang="en-US"/>
               <a:t>Fifth level</a:t>
             </a:r>
-            <a:endParaRPr lang="en-US"/>
           </a:p>
         </p:txBody>
       </p:sp>
@@ -643,7 +630,7 @@
           <a:p>
             <a:fld id="{4A3945FA-A57E-4979-A688-04297D70ECDD}" type="datetimeFigureOut">
               <a:rPr lang="en-US" smtClean="0"/>
-              <a:t>10/8/2016</a:t>
+              <a:t>3/21/2022</a:t>
             </a:fld>
             <a:endParaRPr lang="en-US"/>
           </a:p>
@@ -737,10 +724,9 @@
           <a:lstStyle/>
           <a:p>
             <a:r>
-              <a:rPr lang="en-US" dirty="0" smtClean="0"/>
+              <a:rPr lang="en-US" dirty="0"/>
               <a:t>CLICK TO EDIT MASTER TITLE STYLE</a:t>
             </a:r>
-            <a:endParaRPr lang="en-US" dirty="0"/>
           </a:p>
         </p:txBody>
       </p:sp>
@@ -761,7 +747,7 @@
           <a:p>
             <a:fld id="{4A3945FA-A57E-4979-A688-04297D70ECDD}" type="datetimeFigureOut">
               <a:rPr lang="en-US" smtClean="0"/>
-              <a:t>10/8/2016</a:t>
+              <a:t>3/21/2022</a:t>
             </a:fld>
             <a:endParaRPr lang="en-US"/>
           </a:p>
@@ -819,13 +805,6 @@
   <p:clrMapOvr>
     <a:masterClrMapping/>
   </p:clrMapOvr>
-  <p:timing>
-    <p:tnLst>
-      <p:par>
-        <p:cTn id="1" dur="indefinite" restart="never" nodeType="tmRoot"/>
-      </p:par>
-    </p:tnLst>
-  </p:timing>
 </p:sldLayout>
 </file>
 
@@ -886,7 +865,7 @@
           <a:lstStyle/>
           <a:p>
             <a:r>
-              <a:rPr lang="en-US" smtClean="0"/>
+              <a:rPr lang="en-US"/>
               <a:t>Click to edit Master title style</a:t>
             </a:r>
             <a:endParaRPr lang="en-US" dirty="0"/>
@@ -920,28 +899,28 @@
           <a:p>
             <a:pPr lvl="0"/>
             <a:r>
-              <a:rPr lang="en-US" dirty="0" smtClean="0"/>
+              <a:rPr lang="en-US" dirty="0"/>
               <a:t>Click to edit Master text styles</a:t>
             </a:r>
           </a:p>
           <a:p>
             <a:pPr lvl="1"/>
             <a:r>
-              <a:rPr lang="en-US" dirty="0" smtClean="0"/>
+              <a:rPr lang="en-US" dirty="0"/>
               <a:t>Second level</a:t>
             </a:r>
           </a:p>
           <a:p>
             <a:pPr lvl="2"/>
             <a:r>
-              <a:rPr lang="en-US" dirty="0" smtClean="0"/>
+              <a:rPr lang="en-US" dirty="0"/>
               <a:t>Third level</a:t>
             </a:r>
           </a:p>
           <a:p>
             <a:pPr lvl="3"/>
             <a:r>
-              <a:rPr lang="en-US" dirty="0" smtClean="0"/>
+              <a:rPr lang="en-US" dirty="0"/>
               <a:t>Fourth level</a:t>
             </a:r>
           </a:p>
@@ -980,7 +959,7 @@
           <a:p>
             <a:fld id="{4A3945FA-A57E-4979-A688-04297D70ECDD}" type="datetimeFigureOut">
               <a:rPr lang="en-US" smtClean="0"/>
-              <a:t>10/8/2016</a:t>
+              <a:t>3/21/2022</a:t>
             </a:fld>
             <a:endParaRPr lang="en-US"/>
           </a:p>
@@ -1088,13 +1067,6 @@
     <p:sldLayoutId id="2147483663" r:id="rId3"/>
     <p:sldLayoutId id="2147483664" r:id="rId4"/>
   </p:sldLayoutIdLst>
-  <p:timing>
-    <p:tnLst>
-      <p:par>
-        <p:cTn id="1" dur="indefinite" restart="never" nodeType="tmRoot"/>
-      </p:par>
-    </p:tnLst>
-  </p:timing>
   <p:txStyles>
     <p:titleStyle>
       <a:lvl1pPr algn="l" defTabSz="685800" rtl="0" eaLnBrk="1" latinLnBrk="0" hangingPunct="1">
@@ -1431,7 +1403,7 @@
           <a:lstStyle/>
           <a:p>
             <a:r>
-              <a:rPr lang="cs-CZ" sz="2400" dirty="0" smtClean="0"/>
+              <a:rPr lang="cs-CZ" sz="2400" dirty="0"/>
               <a:t>Debugging tips and tricks</a:t>
             </a:r>
             <a:endParaRPr lang="en-US" sz="2400" dirty="0"/>
@@ -1461,14 +1433,14 @@
           <a:lstStyle/>
           <a:p>
             <a:r>
-              <a:rPr lang="cs-CZ" sz="1800" dirty="0" smtClean="0"/>
+              <a:rPr lang="cs-CZ" sz="1800" dirty="0"/>
               <a:t>Jiří Pokorný</a:t>
             </a:r>
             <a:br>
-              <a:rPr lang="cs-CZ" sz="1800" dirty="0" smtClean="0"/>
+              <a:rPr lang="cs-CZ" sz="1800" dirty="0"/>
             </a:br>
             <a:r>
-              <a:rPr lang="cs-CZ" sz="1800" dirty="0" smtClean="0"/>
+              <a:rPr lang="cs-CZ" sz="1800" dirty="0"/>
               <a:t>jiri.pokorny@solarwinds.com</a:t>
             </a:r>
           </a:p>
@@ -1484,13 +1456,6 @@
   <p:clrMapOvr>
     <a:masterClrMapping/>
   </p:clrMapOvr>
-  <p:timing>
-    <p:tnLst>
-      <p:par>
-        <p:cTn id="1" dur="indefinite" restart="never" nodeType="tmRoot"/>
-      </p:par>
-    </p:tnLst>
-  </p:timing>
 </p:sld>
 </file>
 
@@ -1527,7 +1492,7 @@
           <a:lstStyle/>
           <a:p>
             <a:r>
-              <a:rPr lang="cs-CZ" dirty="0" smtClean="0"/>
+              <a:rPr lang="cs-CZ" dirty="0"/>
               <a:t>Start debugging</a:t>
             </a:r>
             <a:endParaRPr lang="en-US" dirty="0"/>
@@ -1557,35 +1522,31 @@
           <a:lstStyle/>
           <a:p>
             <a:r>
-              <a:rPr lang="cs-CZ" sz="2400" dirty="0" smtClean="0"/>
+              <a:rPr lang="cs-CZ" sz="2400" dirty="0"/>
               <a:t>Get Process ID (PID) and its command line</a:t>
             </a:r>
           </a:p>
           <a:p>
             <a:r>
-              <a:rPr lang="cs-CZ" sz="2400" dirty="0" smtClean="0"/>
+              <a:rPr lang="cs-CZ" sz="2400" dirty="0"/>
               <a:t>Debug &gt;</a:t>
             </a:r>
             <a:r>
-              <a:rPr lang="cs-CZ" sz="2400" baseline="0" dirty="0" smtClean="0"/>
+              <a:rPr lang="cs-CZ" sz="2400" baseline="0" dirty="0"/>
               <a:t> Start new instance</a:t>
             </a:r>
-            <a:endParaRPr lang="cs-CZ" sz="2400" dirty="0" smtClean="0"/>
-          </a:p>
-          <a:p>
-            <a:r>
-              <a:rPr lang="cs-CZ" sz="2400" dirty="0" smtClean="0"/>
+            <a:endParaRPr lang="cs-CZ" sz="2400" dirty="0"/>
+          </a:p>
+          <a:p>
+            <a:r>
+              <a:rPr lang="cs-CZ" sz="2400" dirty="0"/>
               <a:t>Attach to process/Detach all</a:t>
             </a:r>
           </a:p>
           <a:p>
             <a:r>
-              <a:rPr lang="cs-CZ" sz="2400" baseline="0" dirty="0" smtClean="0"/>
-              <a:t>Start </a:t>
-            </a:r>
-            <a:r>
-              <a:rPr lang="cs-CZ" sz="2400" baseline="0" dirty="0" smtClean="0"/>
-              <a:t>Windows Service (Debugger.Launch)</a:t>
+              <a:rPr lang="cs-CZ" sz="2400" baseline="0" dirty="0"/>
+              <a:t>Start Windows Service (Debugger.Launch)</a:t>
             </a:r>
           </a:p>
         </p:txBody>
@@ -1600,13 +1561,6 @@
   <p:clrMapOvr>
     <a:masterClrMapping/>
   </p:clrMapOvr>
-  <p:timing>
-    <p:tnLst>
-      <p:par>
-        <p:cTn id="1" dur="indefinite" restart="never" nodeType="tmRoot"/>
-      </p:par>
-    </p:tnLst>
-  </p:timing>
 </p:sld>
 </file>
 
@@ -1643,7 +1597,7 @@
           <a:lstStyle/>
           <a:p>
             <a:r>
-              <a:rPr lang="cs-CZ" dirty="0" smtClean="0"/>
+              <a:rPr lang="cs-CZ" dirty="0"/>
               <a:t>Process and Thread in debugging</a:t>
             </a:r>
             <a:endParaRPr lang="en-US" dirty="0"/>
@@ -1673,13 +1627,13 @@
           <a:lstStyle/>
           <a:p>
             <a:r>
-              <a:rPr lang="cs-CZ" sz="2400" baseline="0" dirty="0" smtClean="0"/>
+              <a:rPr lang="cs-CZ" sz="2400" baseline="0" dirty="0"/>
               <a:t>Process Window</a:t>
             </a:r>
           </a:p>
           <a:p>
             <a:r>
-              <a:rPr lang="cs-CZ" sz="2400" baseline="0" dirty="0" smtClean="0"/>
+              <a:rPr lang="cs-CZ" sz="2400" baseline="0" dirty="0"/>
               <a:t>Threads window</a:t>
             </a:r>
           </a:p>
@@ -1688,7 +1642,7 @@
               <a:buNone/>
             </a:pPr>
             <a:r>
-              <a:rPr lang="cs-CZ" sz="1800" baseline="0" dirty="0" smtClean="0"/>
+              <a:rPr lang="cs-CZ" sz="1800" baseline="0" dirty="0"/>
               <a:t>Call stack per Thread</a:t>
             </a:r>
           </a:p>
@@ -1697,7 +1651,7 @@
               <a:buNone/>
             </a:pPr>
             <a:r>
-              <a:rPr lang="cs-CZ" sz="1800" baseline="0" dirty="0" smtClean="0"/>
+              <a:rPr lang="cs-CZ" sz="1800" baseline="0" dirty="0"/>
               <a:t>Freeze/Thaw thread</a:t>
             </a:r>
           </a:p>
@@ -1706,20 +1660,20 @@
               <a:buNone/>
             </a:pPr>
             <a:r>
-              <a:rPr lang="cs-CZ" sz="1800" baseline="0" dirty="0" smtClean="0"/>
+              <a:rPr lang="cs-CZ" sz="1800" baseline="0" dirty="0"/>
               <a:t>Switch to Thread</a:t>
             </a:r>
           </a:p>
           <a:p>
             <a:r>
-              <a:rPr lang="cs-CZ" sz="2400" baseline="0" dirty="0" smtClean="0"/>
+              <a:rPr lang="cs-CZ" sz="2400" baseline="0" dirty="0"/>
               <a:t>Windows Parallel Watch</a:t>
             </a:r>
             <a:r>
-              <a:rPr lang="cs-CZ" sz="2400" dirty="0" smtClean="0"/>
+              <a:rPr lang="cs-CZ" sz="2400" dirty="0"/>
               <a:t>/Stack</a:t>
             </a:r>
-            <a:endParaRPr lang="cs-CZ" sz="2400" baseline="0" dirty="0" smtClean="0"/>
+            <a:endParaRPr lang="cs-CZ" sz="2400" baseline="0" dirty="0"/>
           </a:p>
         </p:txBody>
       </p:sp>
@@ -1733,13 +1687,6 @@
   <p:clrMapOvr>
     <a:masterClrMapping/>
   </p:clrMapOvr>
-  <p:timing>
-    <p:tnLst>
-      <p:par>
-        <p:cTn id="1" dur="indefinite" restart="never" nodeType="tmRoot"/>
-      </p:par>
-    </p:tnLst>
-  </p:timing>
 </p:sld>
 </file>
 
@@ -1776,11 +1723,11 @@
           <a:lstStyle/>
           <a:p>
             <a:r>
-              <a:rPr lang="cs-CZ" dirty="0" smtClean="0"/>
+              <a:rPr lang="cs-CZ" dirty="0"/>
               <a:t>Debuggin</a:t>
             </a:r>
             <a:r>
-              <a:rPr lang="cs-CZ" baseline="0" dirty="0" smtClean="0"/>
+              <a:rPr lang="cs-CZ" baseline="0" dirty="0"/>
               <a:t>g without source code</a:t>
             </a:r>
             <a:endParaRPr lang="en-US" dirty="0"/>
@@ -1810,36 +1757,36 @@
           <a:lstStyle/>
           <a:p>
             <a:r>
-              <a:rPr lang="cs-CZ" sz="2400" dirty="0" smtClean="0"/>
+              <a:rPr lang="cs-CZ" sz="2400" dirty="0"/>
               <a:t>What</a:t>
             </a:r>
             <a:r>
-              <a:rPr lang="cs-CZ" sz="2400" baseline="0" dirty="0" smtClean="0"/>
+              <a:rPr lang="cs-CZ" sz="2400" baseline="0" dirty="0"/>
               <a:t> is the PDB?</a:t>
             </a:r>
           </a:p>
           <a:p>
             <a:r>
-              <a:rPr lang="cs-CZ" sz="2400" baseline="0" dirty="0" smtClean="0"/>
+              <a:rPr lang="cs-CZ" sz="2400" baseline="0" dirty="0"/>
               <a:t>Get the pdb from symbol server</a:t>
             </a:r>
           </a:p>
           <a:p>
             <a:r>
-              <a:rPr lang="cs-CZ" sz="2400" baseline="0" dirty="0" smtClean="0"/>
+              <a:rPr lang="cs-CZ" sz="2400" baseline="0" dirty="0"/>
               <a:t>Symbols cache</a:t>
             </a:r>
           </a:p>
           <a:p>
             <a:r>
-              <a:rPr lang="cs-CZ" sz="2400" baseline="0" dirty="0" smtClean="0"/>
+              <a:rPr lang="cs-CZ" sz="2400" baseline="0" dirty="0"/>
               <a:t>Use dotPeek build in Symbol server</a:t>
             </a:r>
             <a:br>
-              <a:rPr lang="cs-CZ" sz="2400" baseline="0" dirty="0" smtClean="0"/>
+              <a:rPr lang="cs-CZ" sz="2400" baseline="0" dirty="0"/>
             </a:br>
             <a:r>
-              <a:rPr lang="cs-CZ" sz="2400" baseline="0" dirty="0" smtClean="0"/>
+              <a:rPr lang="cs-CZ" sz="2400" baseline="0" dirty="0"/>
               <a:t>to decompile source code</a:t>
             </a:r>
           </a:p>
@@ -1855,13 +1802,6 @@
   <p:clrMapOvr>
     <a:masterClrMapping/>
   </p:clrMapOvr>
-  <p:timing>
-    <p:tnLst>
-      <p:par>
-        <p:cTn id="1" dur="indefinite" restart="never" nodeType="tmRoot"/>
-      </p:par>
-    </p:tnLst>
-  </p:timing>
 </p:sld>
 </file>
 
@@ -1898,11 +1838,11 @@
           <a:lstStyle/>
           <a:p>
             <a:r>
-              <a:rPr lang="cs-CZ" dirty="0" smtClean="0"/>
+              <a:rPr lang="cs-CZ" dirty="0"/>
               <a:t>Debug</a:t>
             </a:r>
             <a:r>
-              <a:rPr lang="cs-CZ" baseline="0" dirty="0" smtClean="0"/>
+              <a:rPr lang="cs-CZ" baseline="0" dirty="0"/>
               <a:t> assembly binding</a:t>
             </a:r>
             <a:endParaRPr lang="en-US" dirty="0"/>
@@ -1940,11 +1880,11 @@
           </a:p>
           <a:p>
             <a:r>
-              <a:rPr lang="en-US" sz="2400" dirty="0" smtClean="0"/>
+              <a:rPr lang="en-US" sz="2400" dirty="0"/>
               <a:t>Assembly Binding Log Viewer</a:t>
             </a:r>
             <a:r>
-              <a:rPr lang="cs-CZ" sz="2400" dirty="0" smtClean="0"/>
+              <a:rPr lang="cs-CZ" sz="2400" dirty="0"/>
               <a:t> (Fuslogvw.exe)</a:t>
             </a:r>
             <a:endParaRPr lang="en-US" sz="2400" dirty="0"/>
@@ -1961,13 +1901,6 @@
   <p:clrMapOvr>
     <a:masterClrMapping/>
   </p:clrMapOvr>
-  <p:timing>
-    <p:tnLst>
-      <p:par>
-        <p:cTn id="1" dur="indefinite" restart="never" nodeType="tmRoot"/>
-      </p:par>
-    </p:tnLst>
-  </p:timing>
 </p:sld>
 </file>
 
@@ -2004,11 +1937,11 @@
           <a:lstStyle/>
           <a:p>
             <a:r>
-              <a:rPr lang="cs-CZ" dirty="0" smtClean="0"/>
+              <a:rPr lang="cs-CZ" dirty="0"/>
               <a:t>Debugging</a:t>
             </a:r>
             <a:r>
-              <a:rPr lang="cs-CZ" baseline="0" dirty="0" smtClean="0"/>
+              <a:rPr lang="cs-CZ" baseline="0" dirty="0"/>
               <a:t> web applications</a:t>
             </a:r>
             <a:endParaRPr lang="en-US" dirty="0"/>
@@ -2038,44 +1971,40 @@
           <a:lstStyle/>
           <a:p>
             <a:r>
-              <a:rPr lang="cs-CZ" sz="2400" dirty="0" smtClean="0"/>
+              <a:rPr lang="cs-CZ" sz="2400" dirty="0"/>
               <a:t>Debugging</a:t>
             </a:r>
             <a:r>
-              <a:rPr lang="cs-CZ" sz="2400" baseline="0" dirty="0" smtClean="0"/>
+              <a:rPr lang="cs-CZ" sz="2400" baseline="0" dirty="0"/>
               <a:t> of both browser and server</a:t>
             </a:r>
           </a:p>
           <a:p>
             <a:r>
-              <a:rPr lang="cs-CZ" sz="2400" baseline="0" dirty="0" smtClean="0"/>
+              <a:rPr lang="cs-CZ" sz="2400" baseline="0" dirty="0"/>
               <a:t>JavaScript debugging allowed only for attached debugger</a:t>
             </a:r>
           </a:p>
           <a:p>
             <a:r>
-              <a:rPr lang="cs-CZ" sz="2400" baseline="0" dirty="0" smtClean="0"/>
+              <a:rPr lang="cs-CZ" sz="2400" baseline="0" dirty="0"/>
               <a:t>JavaScript „debugger;“</a:t>
             </a:r>
           </a:p>
           <a:p>
             <a:r>
-              <a:rPr lang="cs-CZ" sz="2400" dirty="0" smtClean="0"/>
+              <a:rPr lang="cs-CZ" sz="2400" dirty="0"/>
               <a:t>W3wp process,</a:t>
             </a:r>
             <a:r>
-              <a:rPr lang="cs-CZ" sz="2400" baseline="0" dirty="0" smtClean="0"/>
+              <a:rPr lang="cs-CZ" sz="2400" baseline="0" dirty="0"/>
               <a:t> its command line and application pool</a:t>
             </a:r>
           </a:p>
           <a:p>
             <a:r>
-              <a:rPr lang="cs-CZ" sz="2400" baseline="0" dirty="0" smtClean="0"/>
-              <a:t>Window Exception Settings – break on custom </a:t>
-            </a:r>
-            <a:r>
-              <a:rPr lang="cs-CZ" sz="2400" baseline="0" dirty="0" smtClean="0"/>
-              <a:t>exception</a:t>
+              <a:rPr lang="cs-CZ" sz="2400" baseline="0" dirty="0"/>
+              <a:t>Window Exception Settings – break on custom exception</a:t>
             </a:r>
           </a:p>
         </p:txBody>
@@ -2090,13 +2019,6 @@
   <p:clrMapOvr>
     <a:masterClrMapping/>
   </p:clrMapOvr>
-  <p:timing>
-    <p:tnLst>
-      <p:par>
-        <p:cTn id="1" dur="indefinite" restart="never" nodeType="tmRoot"/>
-      </p:par>
-    </p:tnLst>
-  </p:timing>
 </p:sld>
 </file>
 
@@ -2133,7 +2055,7 @@
           <a:lstStyle/>
           <a:p>
             <a:r>
-              <a:rPr lang="cs-CZ" dirty="0" smtClean="0"/>
+              <a:rPr lang="cs-CZ" dirty="0"/>
               <a:t>Simple tips</a:t>
             </a:r>
             <a:endParaRPr lang="en-US" dirty="0"/>
@@ -2163,43 +2085,47 @@
           <a:lstStyle/>
           <a:p>
             <a:r>
-              <a:rPr lang="cs-CZ" sz="2400" dirty="0" smtClean="0"/>
+              <a:rPr lang="cs-CZ" sz="2400" dirty="0"/>
               <a:t>Beakpoint location/move</a:t>
             </a:r>
           </a:p>
           <a:p>
             <a:r>
-              <a:rPr lang="cs-CZ" sz="2400" dirty="0" smtClean="0"/>
+              <a:rPr lang="cs-CZ" sz="2400" dirty="0"/>
               <a:t>Breakpoint for each thread</a:t>
             </a:r>
           </a:p>
           <a:p>
             <a:r>
-              <a:rPr lang="cs-CZ" sz="2400" baseline="0" dirty="0" smtClean="0"/>
+              <a:rPr lang="cs-CZ" sz="2400" baseline="0" dirty="0"/>
               <a:t>Override ToString method</a:t>
             </a:r>
           </a:p>
           <a:p>
             <a:r>
               <a:rPr lang="cs-CZ" sz="2400" dirty="0"/>
-              <a:t>DebugerDisplay, DebuggerBrowsabel, DebuggertypeProxy </a:t>
-            </a:r>
-            <a:endParaRPr lang="cs-CZ" sz="2400" baseline="0" dirty="0" smtClean="0"/>
-          </a:p>
-          <a:p>
-            <a:r>
-              <a:rPr lang="cs-CZ" sz="2400" baseline="0" dirty="0" smtClean="0"/>
-              <a:t>Break on function </a:t>
-            </a:r>
-            <a:r>
-              <a:rPr lang="cs-CZ" sz="2400" baseline="0" dirty="0" smtClean="0"/>
-              <a:t>name</a:t>
+              <a:t>DebugerDisplay, </a:t>
+            </a:r>
+            <a:r>
+              <a:rPr lang="cs-CZ" sz="2400" dirty="0" err="1"/>
+              <a:t>DebuggerBrowsable</a:t>
+            </a:r>
+            <a:r>
+              <a:rPr lang="cs-CZ" sz="2400" dirty="0"/>
+              <a:t>, DebuggertypeProxy </a:t>
+            </a:r>
+            <a:endParaRPr lang="cs-CZ" sz="2400" baseline="0" dirty="0"/>
+          </a:p>
+          <a:p>
+            <a:r>
+              <a:rPr lang="cs-CZ" sz="2400" baseline="0" dirty="0"/>
+              <a:t>Break on function name</a:t>
             </a:r>
           </a:p>
           <a:p>
             <a:pPr rtl="0" eaLnBrk="1" latinLnBrk="0" hangingPunct="1"/>
             <a:r>
-              <a:rPr lang="cs-CZ" sz="1800" kern="1200" dirty="0" smtClean="0">
+              <a:rPr lang="cs-CZ" sz="1800" kern="1200" dirty="0">
                 <a:solidFill>
                   <a:schemeClr val="accent4"/>
                 </a:solidFill>
@@ -2210,14 +2136,14 @@
               </a:rPr>
               <a:t>Startup arguments</a:t>
             </a:r>
-            <a:endParaRPr lang="en-US" sz="1800" dirty="0" smtClean="0">
+            <a:endParaRPr lang="en-US" sz="1800" dirty="0">
               <a:effectLst/>
             </a:endParaRPr>
           </a:p>
           <a:p>
             <a:pPr rtl="0" eaLnBrk="1" latinLnBrk="0" hangingPunct="1"/>
             <a:r>
-              <a:rPr lang="cs-CZ" sz="1800" kern="1200" dirty="0" smtClean="0">
+              <a:rPr lang="cs-CZ" sz="1800" kern="1200" dirty="0">
                 <a:solidFill>
                   <a:schemeClr val="accent4"/>
                 </a:solidFill>
@@ -2229,7 +2155,7 @@
               <a:t>Visual</a:t>
             </a:r>
             <a:r>
-              <a:rPr lang="cs-CZ" sz="1800" kern="1200" baseline="0" dirty="0" smtClean="0">
+              <a:rPr lang="cs-CZ" sz="1800" kern="1200" baseline="0" dirty="0">
                 <a:solidFill>
                   <a:schemeClr val="accent4"/>
                 </a:solidFill>
@@ -2240,7 +2166,7 @@
               </a:rPr>
               <a:t> studio hosting process</a:t>
             </a:r>
-            <a:endParaRPr lang="en-US" sz="2400" dirty="0" smtClean="0">
+            <a:endParaRPr lang="en-US" sz="2400" dirty="0">
               <a:effectLst/>
             </a:endParaRPr>
           </a:p>
@@ -2256,13 +2182,6 @@
   <p:clrMapOvr>
     <a:masterClrMapping/>
   </p:clrMapOvr>
-  <p:timing>
-    <p:tnLst>
-      <p:par>
-        <p:cTn id="1" dur="indefinite" restart="never" nodeType="tmRoot"/>
-      </p:par>
-    </p:tnLst>
-  </p:timing>
 </p:sld>
 </file>
 
@@ -2299,7 +2218,7 @@
           <a:lstStyle/>
           <a:p>
             <a:r>
-              <a:rPr lang="cs-CZ" dirty="0" smtClean="0"/>
+              <a:rPr lang="cs-CZ" dirty="0"/>
               <a:t>Remote debugger</a:t>
             </a:r>
             <a:endParaRPr lang="en-US" dirty="0"/>
@@ -2329,30 +2248,28 @@
           <a:lstStyle/>
           <a:p>
             <a:r>
-              <a:rPr lang="cs-CZ" sz="2400" dirty="0" smtClean="0"/>
+              <a:rPr lang="cs-CZ" sz="2400" dirty="0"/>
               <a:t>Installed</a:t>
             </a:r>
             <a:r>
-              <a:rPr lang="cs-CZ" sz="2400" baseline="0" dirty="0" smtClean="0"/>
+              <a:rPr lang="cs-CZ" sz="2400" baseline="0" dirty="0"/>
               <a:t> with Visual Studio</a:t>
             </a:r>
-            <a:endParaRPr lang="cs-CZ" sz="2400" dirty="0" smtClean="0"/>
-          </a:p>
-          <a:p>
-            <a:r>
-              <a:rPr lang="cs-CZ" sz="2400" dirty="0" smtClean="0"/>
-              <a:t>Standalone Install usually fails</a:t>
-            </a:r>
-          </a:p>
-          <a:p>
-            <a:r>
-              <a:rPr lang="cs-CZ" sz="2400" dirty="0" smtClean="0"/>
-              <a:t>Needs identical credentials on both machines</a:t>
-            </a:r>
-          </a:p>
-          <a:p>
-            <a:r>
-              <a:rPr lang="cs-CZ" sz="2400" dirty="0" smtClean="0"/>
+            <a:endParaRPr lang="cs-CZ" sz="2400" dirty="0"/>
+          </a:p>
+          <a:p>
+            <a:r>
+              <a:rPr lang="cs-CZ" sz="2400" dirty="0" err="1"/>
+              <a:t>Needs</a:t>
+            </a:r>
+            <a:r>
+              <a:rPr lang="cs-CZ" sz="2400" dirty="0"/>
+              <a:t> identical credentials on both machines</a:t>
+            </a:r>
+          </a:p>
+          <a:p>
+            <a:r>
+              <a:rPr lang="cs-CZ" sz="2400" dirty="0"/>
               <a:t>Attach to process only on different machine</a:t>
             </a:r>
             <a:endParaRPr lang="en-US" sz="2400" dirty="0"/>
@@ -2369,13 +2286,6 @@
   <p:clrMapOvr>
     <a:masterClrMapping/>
   </p:clrMapOvr>
-  <p:timing>
-    <p:tnLst>
-      <p:par>
-        <p:cTn id="1" dur="indefinite" restart="never" nodeType="tmRoot"/>
-      </p:par>
-    </p:tnLst>
-  </p:timing>
 </p:sld>
 </file>
 
@@ -2436,15 +2346,15 @@
           <a:lstStyle/>
           <a:p>
             <a:r>
-              <a:rPr lang="cs-CZ" dirty="0" smtClean="0"/>
+              <a:rPr lang="cs-CZ" dirty="0"/>
               <a:t>Solar</a:t>
             </a:r>
             <a:r>
-              <a:rPr lang="en-US" dirty="0" smtClean="0"/>
+              <a:rPr lang="en-US" dirty="0"/>
               <a:t>w</a:t>
             </a:r>
             <a:r>
-              <a:rPr lang="cs-CZ" dirty="0" smtClean="0"/>
+              <a:rPr lang="cs-CZ" dirty="0"/>
               <a:t>inds</a:t>
             </a:r>
             <a:endParaRPr lang="en-US" dirty="0"/>
@@ -2482,7 +2392,7 @@
               <a:defRPr/>
             </a:pPr>
             <a:r>
-              <a:rPr lang="en-US" dirty="0" smtClean="0">
+              <a:rPr lang="en-US" dirty="0">
                 <a:solidFill>
                   <a:schemeClr val="tx1"/>
                 </a:solidFill>
@@ -2520,7 +2430,7 @@
               <a:defRPr/>
             </a:pPr>
             <a:r>
-              <a:rPr lang="en-US" dirty="0" smtClean="0">
+              <a:rPr lang="en-US" dirty="0">
                 <a:solidFill>
                   <a:schemeClr val="tx1"/>
                 </a:solidFill>
@@ -2529,7 +2439,7 @@
               <a:t>Brno office – </a:t>
             </a:r>
             <a:r>
-              <a:rPr lang="en-US" dirty="0" err="1" smtClean="0">
+              <a:rPr lang="en-US" dirty="0" err="1">
                 <a:solidFill>
                   <a:schemeClr val="tx1"/>
                 </a:solidFill>
@@ -2538,7 +2448,7 @@
               <a:t>Solarwinds</a:t>
             </a:r>
             <a:r>
-              <a:rPr lang="en-US" dirty="0" smtClean="0">
+              <a:rPr lang="en-US" dirty="0">
                 <a:solidFill>
                   <a:schemeClr val="tx1"/>
                 </a:solidFill>
@@ -2552,33 +2462,15 @@
               <a:defRPr/>
             </a:pPr>
             <a:r>
-              <a:rPr lang="cs-CZ" dirty="0" smtClean="0">
-                <a:solidFill>
-                  <a:schemeClr val="tx1"/>
-                </a:solidFill>
-                <a:hlinkClick r:id="rId3"/>
-              </a:rPr>
-              <a:t>https</a:t>
-            </a:r>
-            <a:r>
               <a:rPr lang="cs-CZ" dirty="0">
                 <a:solidFill>
                   <a:schemeClr val="tx1"/>
                 </a:solidFill>
                 <a:hlinkClick r:id="rId3"/>
               </a:rPr>
-              <a:t>://www.solarwindsmeetup.com</a:t>
-            </a:r>
-            <a:r>
-              <a:rPr lang="cs-CZ" dirty="0" smtClean="0">
-                <a:solidFill>
-                  <a:schemeClr val="tx1"/>
-                </a:solidFill>
-                <a:hlinkClick r:id="rId3"/>
-              </a:rPr>
-              <a:t>/</a:t>
-            </a:r>
-            <a:endParaRPr lang="cs-CZ" dirty="0" smtClean="0">
+              <a:t>https://www.solarwindsmeetup.com/</a:t>
+            </a:r>
+            <a:endParaRPr lang="cs-CZ" dirty="0">
               <a:solidFill>
                 <a:schemeClr val="tx1"/>
               </a:solidFill>
@@ -2589,7 +2481,7 @@
               <a:defRPr/>
             </a:pPr>
             <a:r>
-              <a:rPr lang="cs-CZ" dirty="0" smtClean="0">
+              <a:rPr lang="cs-CZ" dirty="0">
                 <a:solidFill>
                   <a:schemeClr val="tx1"/>
                 </a:solidFill>
@@ -2602,16 +2494,10 @@
               <a:defRPr/>
             </a:pPr>
             <a:r>
-              <a:rPr lang="en-US" dirty="0" smtClean="0">
-                <a:hlinkClick r:id="rId4"/>
-              </a:rPr>
-              <a:t>http</a:t>
-            </a:r>
-            <a:r>
               <a:rPr lang="en-US" dirty="0">
                 <a:hlinkClick r:id="rId4"/>
               </a:rPr>
-              <a:t>://solarwinds.jobs/</a:t>
+              <a:t>http://solarwinds.jobs/</a:t>
             </a:r>
           </a:p>
           <a:p>
@@ -2619,7 +2505,7 @@
               <a:defRPr/>
             </a:pPr>
             <a:r>
-              <a:rPr lang="en-US" dirty="0" smtClean="0">
+              <a:rPr lang="en-US" dirty="0">
                 <a:solidFill>
                   <a:schemeClr val="tx1"/>
                 </a:solidFill>

</xml_diff>